<commit_message>
add docs for teamproject
add docs for teamproject
</commit_message>
<xml_diff>
--- a/docs/Team_project1.pptx
+++ b/docs/Team_project1.pptx
@@ -172,6 +172,35 @@
     </p:ext>
   </p:extLst>
 </p:presentation>
+</file>
+
+<file path=ppt/changesInfos/changesInfo1.xml><?xml version="1.0" encoding="utf-8"?>
+<pc:chgInfo xmlns:a="http://schemas.openxmlformats.org/drawingml/2006/main" xmlns:r="http://schemas.openxmlformats.org/officeDocument/2006/relationships" xmlns:ac="http://schemas.microsoft.com/office/drawing/2013/main/command" xmlns:pc="http://schemas.microsoft.com/office/powerpoint/2013/main/command">
+  <pc:docChgLst>
+    <pc:chgData name="김 동희" userId="f54a293faeff415e" providerId="LiveId" clId="{F124C4C9-0F2D-7F43-9514-D708D2CD5072}"/>
+    <pc:docChg chg="modSld">
+      <pc:chgData name="김 동희" userId="f54a293faeff415e" providerId="LiveId" clId="{F124C4C9-0F2D-7F43-9514-D708D2CD5072}" dt="2020-11-03T07:14:20.678" v="1" actId="20577"/>
+      <pc:docMkLst>
+        <pc:docMk/>
+      </pc:docMkLst>
+      <pc:sldChg chg="modSp mod">
+        <pc:chgData name="김 동희" userId="f54a293faeff415e" providerId="LiveId" clId="{F124C4C9-0F2D-7F43-9514-D708D2CD5072}" dt="2020-11-03T07:14:20.678" v="1" actId="20577"/>
+        <pc:sldMkLst>
+          <pc:docMk/>
+          <pc:sldMk cId="547611556" sldId="675"/>
+        </pc:sldMkLst>
+        <pc:spChg chg="mod">
+          <ac:chgData name="김 동희" userId="f54a293faeff415e" providerId="LiveId" clId="{F124C4C9-0F2D-7F43-9514-D708D2CD5072}" dt="2020-11-03T07:14:20.678" v="1" actId="20577"/>
+          <ac:spMkLst>
+            <pc:docMk/>
+            <pc:sldMk cId="547611556" sldId="675"/>
+            <ac:spMk id="4" creationId="{D8BD98BA-A413-8744-AA48-2AED74537A3A}"/>
+          </ac:spMkLst>
+        </pc:spChg>
+      </pc:sldChg>
+    </pc:docChg>
+  </pc:docChgLst>
+</pc:chgInfo>
 </file>
 
 <file path=ppt/ink/ink1.xml><?xml version="1.0" encoding="utf-8"?>
@@ -2386,7 +2415,7 @@
           <a:p>
             <a:fld id="{3F8E4EF3-7FAC-4AF9-AF98-E30F6AD30461}" type="datetimeFigureOut">
               <a:rPr lang="en-US" smtClean="0"/>
-              <a:t>11/2/20</a:t>
+              <a:t>11/3/20</a:t>
             </a:fld>
             <a:endParaRPr lang="en-US"/>
           </a:p>
@@ -7019,8 +7048,8 @@
           </a:p>
         </p:txBody>
       </p:sp>
-      <mc:AlternateContent xmlns:mc="http://schemas.openxmlformats.org/markup-compatibility/2006">
-        <mc:Choice xmlns:p14="http://schemas.microsoft.com/office/powerpoint/2010/main" Requires="p14">
+      <mc:AlternateContent xmlns:mc="http://schemas.openxmlformats.org/markup-compatibility/2006" xmlns:p14="http://schemas.microsoft.com/office/powerpoint/2010/main">
+        <mc:Choice Requires="p14">
           <p:contentPart p14:bwMode="auto" r:id="rId3">
             <p14:nvContentPartPr>
               <p14:cNvPr id="12" name="잉크 11">
@@ -7039,7 +7068,7 @@
             </p14:xfrm>
           </p:contentPart>
         </mc:Choice>
-        <mc:Fallback>
+        <mc:Fallback xmlns="">
           <p:pic>
             <p:nvPicPr>
               <p:cNvPr id="12" name="잉크 11">
@@ -7070,8 +7099,8 @@
           </p:pic>
         </mc:Fallback>
       </mc:AlternateContent>
-      <mc:AlternateContent xmlns:mc="http://schemas.openxmlformats.org/markup-compatibility/2006">
-        <mc:Choice xmlns:p14="http://schemas.microsoft.com/office/powerpoint/2010/main" Requires="p14">
+      <mc:AlternateContent xmlns:mc="http://schemas.openxmlformats.org/markup-compatibility/2006" xmlns:p14="http://schemas.microsoft.com/office/powerpoint/2010/main">
+        <mc:Choice Requires="p14">
           <p:contentPart p14:bwMode="auto" r:id="rId5">
             <p14:nvContentPartPr>
               <p14:cNvPr id="13" name="잉크 12">
@@ -7090,7 +7119,7 @@
             </p14:xfrm>
           </p:contentPart>
         </mc:Choice>
-        <mc:Fallback>
+        <mc:Fallback xmlns="">
           <p:pic>
             <p:nvPicPr>
               <p:cNvPr id="13" name="잉크 12">
@@ -7121,8 +7150,8 @@
           </p:pic>
         </mc:Fallback>
       </mc:AlternateContent>
-      <mc:AlternateContent xmlns:mc="http://schemas.openxmlformats.org/markup-compatibility/2006">
-        <mc:Choice xmlns:p14="http://schemas.microsoft.com/office/powerpoint/2010/main" Requires="p14">
+      <mc:AlternateContent xmlns:mc="http://schemas.openxmlformats.org/markup-compatibility/2006" xmlns:p14="http://schemas.microsoft.com/office/powerpoint/2010/main">
+        <mc:Choice Requires="p14">
           <p:contentPart p14:bwMode="auto" r:id="rId7">
             <p14:nvContentPartPr>
               <p14:cNvPr id="14" name="잉크 13">
@@ -7141,7 +7170,7 @@
             </p14:xfrm>
           </p:contentPart>
         </mc:Choice>
-        <mc:Fallback>
+        <mc:Fallback xmlns="">
           <p:pic>
             <p:nvPicPr>
               <p:cNvPr id="14" name="잉크 13">
@@ -7172,8 +7201,8 @@
           </p:pic>
         </mc:Fallback>
       </mc:AlternateContent>
-      <mc:AlternateContent xmlns:mc="http://schemas.openxmlformats.org/markup-compatibility/2006">
-        <mc:Choice xmlns:p14="http://schemas.microsoft.com/office/powerpoint/2010/main" Requires="p14">
+      <mc:AlternateContent xmlns:mc="http://schemas.openxmlformats.org/markup-compatibility/2006" xmlns:p14="http://schemas.microsoft.com/office/powerpoint/2010/main">
+        <mc:Choice Requires="p14">
           <p:contentPart p14:bwMode="auto" r:id="rId9">
             <p14:nvContentPartPr>
               <p14:cNvPr id="16" name="잉크 15">
@@ -7192,7 +7221,7 @@
             </p14:xfrm>
           </p:contentPart>
         </mc:Choice>
-        <mc:Fallback>
+        <mc:Fallback xmlns="">
           <p:pic>
             <p:nvPicPr>
               <p:cNvPr id="16" name="잉크 15">
@@ -7223,8 +7252,8 @@
           </p:pic>
         </mc:Fallback>
       </mc:AlternateContent>
-      <mc:AlternateContent xmlns:mc="http://schemas.openxmlformats.org/markup-compatibility/2006">
-        <mc:Choice xmlns:p14="http://schemas.microsoft.com/office/powerpoint/2010/main" Requires="p14">
+      <mc:AlternateContent xmlns:mc="http://schemas.openxmlformats.org/markup-compatibility/2006" xmlns:p14="http://schemas.microsoft.com/office/powerpoint/2010/main">
+        <mc:Choice Requires="p14">
           <p:contentPart p14:bwMode="auto" r:id="rId11">
             <p14:nvContentPartPr>
               <p14:cNvPr id="20" name="잉크 19">
@@ -7243,7 +7272,7 @@
             </p14:xfrm>
           </p:contentPart>
         </mc:Choice>
-        <mc:Fallback>
+        <mc:Fallback xmlns="">
           <p:pic>
             <p:nvPicPr>
               <p:cNvPr id="20" name="잉크 19">
@@ -7274,8 +7303,8 @@
           </p:pic>
         </mc:Fallback>
       </mc:AlternateContent>
-      <mc:AlternateContent xmlns:mc="http://schemas.openxmlformats.org/markup-compatibility/2006">
-        <mc:Choice xmlns:p14="http://schemas.microsoft.com/office/powerpoint/2010/main" Requires="p14">
+      <mc:AlternateContent xmlns:mc="http://schemas.openxmlformats.org/markup-compatibility/2006" xmlns:p14="http://schemas.microsoft.com/office/powerpoint/2010/main">
+        <mc:Choice Requires="p14">
           <p:contentPart p14:bwMode="auto" r:id="rId13">
             <p14:nvContentPartPr>
               <p14:cNvPr id="21" name="잉크 20">
@@ -7294,7 +7323,7 @@
             </p14:xfrm>
           </p:contentPart>
         </mc:Choice>
-        <mc:Fallback>
+        <mc:Fallback xmlns="">
           <p:pic>
             <p:nvPicPr>
               <p:cNvPr id="21" name="잉크 20">
@@ -7325,8 +7354,8 @@
           </p:pic>
         </mc:Fallback>
       </mc:AlternateContent>
-      <mc:AlternateContent xmlns:mc="http://schemas.openxmlformats.org/markup-compatibility/2006">
-        <mc:Choice xmlns:p14="http://schemas.microsoft.com/office/powerpoint/2010/main" Requires="p14">
+      <mc:AlternateContent xmlns:mc="http://schemas.openxmlformats.org/markup-compatibility/2006" xmlns:p14="http://schemas.microsoft.com/office/powerpoint/2010/main">
+        <mc:Choice Requires="p14">
           <p:contentPart p14:bwMode="auto" r:id="rId15">
             <p14:nvContentPartPr>
               <p14:cNvPr id="22" name="잉크 21">
@@ -7345,7 +7374,7 @@
             </p14:xfrm>
           </p:contentPart>
         </mc:Choice>
-        <mc:Fallback>
+        <mc:Fallback xmlns="">
           <p:pic>
             <p:nvPicPr>
               <p:cNvPr id="22" name="잉크 21">
@@ -7376,8 +7405,8 @@
           </p:pic>
         </mc:Fallback>
       </mc:AlternateContent>
-      <mc:AlternateContent xmlns:mc="http://schemas.openxmlformats.org/markup-compatibility/2006">
-        <mc:Choice xmlns:p14="http://schemas.microsoft.com/office/powerpoint/2010/main" Requires="p14">
+      <mc:AlternateContent xmlns:mc="http://schemas.openxmlformats.org/markup-compatibility/2006" xmlns:p14="http://schemas.microsoft.com/office/powerpoint/2010/main">
+        <mc:Choice Requires="p14">
           <p:contentPart p14:bwMode="auto" r:id="rId17">
             <p14:nvContentPartPr>
               <p14:cNvPr id="24" name="잉크 23">
@@ -7396,7 +7425,7 @@
             </p14:xfrm>
           </p:contentPart>
         </mc:Choice>
-        <mc:Fallback>
+        <mc:Fallback xmlns="">
           <p:pic>
             <p:nvPicPr>
               <p:cNvPr id="24" name="잉크 23">
@@ -7427,8 +7456,8 @@
           </p:pic>
         </mc:Fallback>
       </mc:AlternateContent>
-      <mc:AlternateContent xmlns:mc="http://schemas.openxmlformats.org/markup-compatibility/2006">
-        <mc:Choice xmlns:p14="http://schemas.microsoft.com/office/powerpoint/2010/main" Requires="p14">
+      <mc:AlternateContent xmlns:mc="http://schemas.openxmlformats.org/markup-compatibility/2006" xmlns:p14="http://schemas.microsoft.com/office/powerpoint/2010/main">
+        <mc:Choice Requires="p14">
           <p:contentPart p14:bwMode="auto" r:id="rId19">
             <p14:nvContentPartPr>
               <p14:cNvPr id="25" name="잉크 24">
@@ -7447,7 +7476,7 @@
             </p14:xfrm>
           </p:contentPart>
         </mc:Choice>
-        <mc:Fallback>
+        <mc:Fallback xmlns="">
           <p:pic>
             <p:nvPicPr>
               <p:cNvPr id="25" name="잉크 24">
@@ -7478,8 +7507,8 @@
           </p:pic>
         </mc:Fallback>
       </mc:AlternateContent>
-      <mc:AlternateContent xmlns:mc="http://schemas.openxmlformats.org/markup-compatibility/2006">
-        <mc:Choice xmlns:p14="http://schemas.microsoft.com/office/powerpoint/2010/main" Requires="p14">
+      <mc:AlternateContent xmlns:mc="http://schemas.openxmlformats.org/markup-compatibility/2006" xmlns:p14="http://schemas.microsoft.com/office/powerpoint/2010/main">
+        <mc:Choice Requires="p14">
           <p:contentPart p14:bwMode="auto" r:id="rId21">
             <p14:nvContentPartPr>
               <p14:cNvPr id="26" name="잉크 25">
@@ -7498,7 +7527,7 @@
             </p14:xfrm>
           </p:contentPart>
         </mc:Choice>
-        <mc:Fallback>
+        <mc:Fallback xmlns="">
           <p:pic>
             <p:nvPicPr>
               <p:cNvPr id="26" name="잉크 25">
@@ -7569,8 +7598,8 @@
           </a:fontRef>
         </p:style>
       </p:cxnSp>
-      <mc:AlternateContent xmlns:mc="http://schemas.openxmlformats.org/markup-compatibility/2006">
-        <mc:Choice xmlns:p14="http://schemas.microsoft.com/office/powerpoint/2010/main" Requires="p14">
+      <mc:AlternateContent xmlns:mc="http://schemas.openxmlformats.org/markup-compatibility/2006" xmlns:p14="http://schemas.microsoft.com/office/powerpoint/2010/main">
+        <mc:Choice Requires="p14">
           <p:contentPart p14:bwMode="auto" r:id="rId23">
             <p14:nvContentPartPr>
               <p14:cNvPr id="32" name="잉크 31">
@@ -7589,7 +7618,7 @@
             </p14:xfrm>
           </p:contentPart>
         </mc:Choice>
-        <mc:Fallback>
+        <mc:Fallback xmlns="">
           <p:pic>
             <p:nvPicPr>
               <p:cNvPr id="32" name="잉크 31">
@@ -7620,8 +7649,8 @@
           </p:pic>
         </mc:Fallback>
       </mc:AlternateContent>
-      <mc:AlternateContent xmlns:mc="http://schemas.openxmlformats.org/markup-compatibility/2006">
-        <mc:Choice xmlns:p14="http://schemas.microsoft.com/office/powerpoint/2010/main" Requires="p14">
+      <mc:AlternateContent xmlns:mc="http://schemas.openxmlformats.org/markup-compatibility/2006" xmlns:p14="http://schemas.microsoft.com/office/powerpoint/2010/main">
+        <mc:Choice Requires="p14">
           <p:contentPart p14:bwMode="auto" r:id="rId25">
             <p14:nvContentPartPr>
               <p14:cNvPr id="33" name="잉크 32">
@@ -7640,7 +7669,7 @@
             </p14:xfrm>
           </p:contentPart>
         </mc:Choice>
-        <mc:Fallback>
+        <mc:Fallback xmlns="">
           <p:pic>
             <p:nvPicPr>
               <p:cNvPr id="33" name="잉크 32">
@@ -7671,8 +7700,8 @@
           </p:pic>
         </mc:Fallback>
       </mc:AlternateContent>
-      <mc:AlternateContent xmlns:mc="http://schemas.openxmlformats.org/markup-compatibility/2006">
-        <mc:Choice xmlns:p14="http://schemas.microsoft.com/office/powerpoint/2010/main" Requires="p14">
+      <mc:AlternateContent xmlns:mc="http://schemas.openxmlformats.org/markup-compatibility/2006" xmlns:p14="http://schemas.microsoft.com/office/powerpoint/2010/main">
+        <mc:Choice Requires="p14">
           <p:contentPart p14:bwMode="auto" r:id="rId27">
             <p14:nvContentPartPr>
               <p14:cNvPr id="34" name="잉크 33">
@@ -7691,7 +7720,7 @@
             </p14:xfrm>
           </p:contentPart>
         </mc:Choice>
-        <mc:Fallback>
+        <mc:Fallback xmlns="">
           <p:pic>
             <p:nvPicPr>
               <p:cNvPr id="34" name="잉크 33">
@@ -7722,8 +7751,8 @@
           </p:pic>
         </mc:Fallback>
       </mc:AlternateContent>
-      <mc:AlternateContent xmlns:mc="http://schemas.openxmlformats.org/markup-compatibility/2006">
-        <mc:Choice xmlns:p14="http://schemas.microsoft.com/office/powerpoint/2010/main" Requires="p14">
+      <mc:AlternateContent xmlns:mc="http://schemas.openxmlformats.org/markup-compatibility/2006" xmlns:p14="http://schemas.microsoft.com/office/powerpoint/2010/main">
+        <mc:Choice Requires="p14">
           <p:contentPart p14:bwMode="auto" r:id="rId29">
             <p14:nvContentPartPr>
               <p14:cNvPr id="35" name="잉크 34">
@@ -7742,7 +7771,7 @@
             </p14:xfrm>
           </p:contentPart>
         </mc:Choice>
-        <mc:Fallback>
+        <mc:Fallback xmlns="">
           <p:pic>
             <p:nvPicPr>
               <p:cNvPr id="35" name="잉크 34">
@@ -7773,8 +7802,8 @@
           </p:pic>
         </mc:Fallback>
       </mc:AlternateContent>
-      <mc:AlternateContent xmlns:mc="http://schemas.openxmlformats.org/markup-compatibility/2006">
-        <mc:Choice xmlns:p14="http://schemas.microsoft.com/office/powerpoint/2010/main" Requires="p14">
+      <mc:AlternateContent xmlns:mc="http://schemas.openxmlformats.org/markup-compatibility/2006" xmlns:p14="http://schemas.microsoft.com/office/powerpoint/2010/main">
+        <mc:Choice Requires="p14">
           <p:contentPart p14:bwMode="auto" r:id="rId31">
             <p14:nvContentPartPr>
               <p14:cNvPr id="36" name="잉크 35">
@@ -7793,7 +7822,7 @@
             </p14:xfrm>
           </p:contentPart>
         </mc:Choice>
-        <mc:Fallback>
+        <mc:Fallback xmlns="">
           <p:pic>
             <p:nvPicPr>
               <p:cNvPr id="36" name="잉크 35">
@@ -7824,8 +7853,8 @@
           </p:pic>
         </mc:Fallback>
       </mc:AlternateContent>
-      <mc:AlternateContent xmlns:mc="http://schemas.openxmlformats.org/markup-compatibility/2006">
-        <mc:Choice xmlns:p14="http://schemas.microsoft.com/office/powerpoint/2010/main" Requires="p14">
+      <mc:AlternateContent xmlns:mc="http://schemas.openxmlformats.org/markup-compatibility/2006" xmlns:p14="http://schemas.microsoft.com/office/powerpoint/2010/main">
+        <mc:Choice Requires="p14">
           <p:contentPart p14:bwMode="auto" r:id="rId33">
             <p14:nvContentPartPr>
               <p14:cNvPr id="39" name="잉크 38">
@@ -7844,7 +7873,7 @@
             </p14:xfrm>
           </p:contentPart>
         </mc:Choice>
-        <mc:Fallback>
+        <mc:Fallback xmlns="">
           <p:pic>
             <p:nvPicPr>
               <p:cNvPr id="39" name="잉크 38">
@@ -7875,8 +7904,8 @@
           </p:pic>
         </mc:Fallback>
       </mc:AlternateContent>
-      <mc:AlternateContent xmlns:mc="http://schemas.openxmlformats.org/markup-compatibility/2006">
-        <mc:Choice xmlns:p14="http://schemas.microsoft.com/office/powerpoint/2010/main" Requires="p14">
+      <mc:AlternateContent xmlns:mc="http://schemas.openxmlformats.org/markup-compatibility/2006" xmlns:p14="http://schemas.microsoft.com/office/powerpoint/2010/main">
+        <mc:Choice Requires="p14">
           <p:contentPart p14:bwMode="auto" r:id="rId35">
             <p14:nvContentPartPr>
               <p14:cNvPr id="40" name="잉크 39">
@@ -7895,7 +7924,7 @@
             </p14:xfrm>
           </p:contentPart>
         </mc:Choice>
-        <mc:Fallback>
+        <mc:Fallback xmlns="">
           <p:pic>
             <p:nvPicPr>
               <p:cNvPr id="40" name="잉크 39">
@@ -7946,8 +7975,8 @@
             <a:chExt cx="906840" cy="1774080"/>
           </a:xfrm>
         </p:grpSpPr>
-        <mc:AlternateContent xmlns:mc="http://schemas.openxmlformats.org/markup-compatibility/2006">
-          <mc:Choice xmlns:p14="http://schemas.microsoft.com/office/powerpoint/2010/main" Requires="p14">
+        <mc:AlternateContent xmlns:mc="http://schemas.openxmlformats.org/markup-compatibility/2006" xmlns:p14="http://schemas.microsoft.com/office/powerpoint/2010/main">
+          <mc:Choice Requires="p14">
             <p:contentPart p14:bwMode="auto" r:id="rId37">
               <p14:nvContentPartPr>
                 <p14:cNvPr id="41" name="잉크 40">
@@ -7966,7 +7995,7 @@
               </p14:xfrm>
             </p:contentPart>
           </mc:Choice>
-          <mc:Fallback>
+          <mc:Fallback xmlns="">
             <p:pic>
               <p:nvPicPr>
                 <p:cNvPr id="41" name="잉크 40">
@@ -7997,8 +8026,8 @@
             </p:pic>
           </mc:Fallback>
         </mc:AlternateContent>
-        <mc:AlternateContent xmlns:mc="http://schemas.openxmlformats.org/markup-compatibility/2006">
-          <mc:Choice xmlns:p14="http://schemas.microsoft.com/office/powerpoint/2010/main" Requires="p14">
+        <mc:AlternateContent xmlns:mc="http://schemas.openxmlformats.org/markup-compatibility/2006" xmlns:p14="http://schemas.microsoft.com/office/powerpoint/2010/main">
+          <mc:Choice Requires="p14">
             <p:contentPart p14:bwMode="auto" r:id="rId39">
               <p14:nvContentPartPr>
                 <p14:cNvPr id="42" name="잉크 41">
@@ -8017,7 +8046,7 @@
               </p14:xfrm>
             </p:contentPart>
           </mc:Choice>
-          <mc:Fallback>
+          <mc:Fallback xmlns="">
             <p:pic>
               <p:nvPicPr>
                 <p:cNvPr id="42" name="잉크 41">
@@ -8049,8 +8078,8 @@
           </mc:Fallback>
         </mc:AlternateContent>
       </p:grpSp>
-      <mc:AlternateContent xmlns:mc="http://schemas.openxmlformats.org/markup-compatibility/2006">
-        <mc:Choice xmlns:p14="http://schemas.microsoft.com/office/powerpoint/2010/main" Requires="p14">
+      <mc:AlternateContent xmlns:mc="http://schemas.openxmlformats.org/markup-compatibility/2006" xmlns:p14="http://schemas.microsoft.com/office/powerpoint/2010/main">
+        <mc:Choice Requires="p14">
           <p:contentPart p14:bwMode="auto" r:id="rId41">
             <p14:nvContentPartPr>
               <p14:cNvPr id="44" name="잉크 43">
@@ -8069,7 +8098,7 @@
             </p14:xfrm>
           </p:contentPart>
         </mc:Choice>
-        <mc:Fallback>
+        <mc:Fallback xmlns="">
           <p:pic>
             <p:nvPicPr>
               <p:cNvPr id="44" name="잉크 43">
@@ -8100,8 +8129,8 @@
           </p:pic>
         </mc:Fallback>
       </mc:AlternateContent>
-      <mc:AlternateContent xmlns:mc="http://schemas.openxmlformats.org/markup-compatibility/2006">
-        <mc:Choice xmlns:p14="http://schemas.microsoft.com/office/powerpoint/2010/main" Requires="p14">
+      <mc:AlternateContent xmlns:mc="http://schemas.openxmlformats.org/markup-compatibility/2006" xmlns:p14="http://schemas.microsoft.com/office/powerpoint/2010/main">
+        <mc:Choice Requires="p14">
           <p:contentPart p14:bwMode="auto" r:id="rId43">
             <p14:nvContentPartPr>
               <p14:cNvPr id="45" name="잉크 44">
@@ -8120,7 +8149,7 @@
             </p14:xfrm>
           </p:contentPart>
         </mc:Choice>
-        <mc:Fallback>
+        <mc:Fallback xmlns="">
           <p:pic>
             <p:nvPicPr>
               <p:cNvPr id="45" name="잉크 44">
@@ -8151,8 +8180,8 @@
           </p:pic>
         </mc:Fallback>
       </mc:AlternateContent>
-      <mc:AlternateContent xmlns:mc="http://schemas.openxmlformats.org/markup-compatibility/2006">
-        <mc:Choice xmlns:p14="http://schemas.microsoft.com/office/powerpoint/2010/main" Requires="p14">
+      <mc:AlternateContent xmlns:mc="http://schemas.openxmlformats.org/markup-compatibility/2006" xmlns:p14="http://schemas.microsoft.com/office/powerpoint/2010/main">
+        <mc:Choice Requires="p14">
           <p:contentPart p14:bwMode="auto" r:id="rId45">
             <p14:nvContentPartPr>
               <p14:cNvPr id="46" name="잉크 45">
@@ -8171,7 +8200,7 @@
             </p14:xfrm>
           </p:contentPart>
         </mc:Choice>
-        <mc:Fallback>
+        <mc:Fallback xmlns="">
           <p:pic>
             <p:nvPicPr>
               <p:cNvPr id="46" name="잉크 45">
@@ -8202,8 +8231,8 @@
           </p:pic>
         </mc:Fallback>
       </mc:AlternateContent>
-      <mc:AlternateContent xmlns:mc="http://schemas.openxmlformats.org/markup-compatibility/2006">
-        <mc:Choice xmlns:p14="http://schemas.microsoft.com/office/powerpoint/2010/main" Requires="p14">
+      <mc:AlternateContent xmlns:mc="http://schemas.openxmlformats.org/markup-compatibility/2006" xmlns:p14="http://schemas.microsoft.com/office/powerpoint/2010/main">
+        <mc:Choice Requires="p14">
           <p:contentPart p14:bwMode="auto" r:id="rId47">
             <p14:nvContentPartPr>
               <p14:cNvPr id="47" name="잉크 46">
@@ -8222,7 +8251,7 @@
             </p14:xfrm>
           </p:contentPart>
         </mc:Choice>
-        <mc:Fallback>
+        <mc:Fallback xmlns="">
           <p:pic>
             <p:nvPicPr>
               <p:cNvPr id="47" name="잉크 46">
@@ -8253,8 +8282,8 @@
           </p:pic>
         </mc:Fallback>
       </mc:AlternateContent>
-      <mc:AlternateContent xmlns:mc="http://schemas.openxmlformats.org/markup-compatibility/2006">
-        <mc:Choice xmlns:p14="http://schemas.microsoft.com/office/powerpoint/2010/main" Requires="p14">
+      <mc:AlternateContent xmlns:mc="http://schemas.openxmlformats.org/markup-compatibility/2006" xmlns:p14="http://schemas.microsoft.com/office/powerpoint/2010/main">
+        <mc:Choice Requires="p14">
           <p:contentPart p14:bwMode="auto" r:id="rId49">
             <p14:nvContentPartPr>
               <p14:cNvPr id="48" name="잉크 47">
@@ -8273,7 +8302,7 @@
             </p14:xfrm>
           </p:contentPart>
         </mc:Choice>
-        <mc:Fallback>
+        <mc:Fallback xmlns="">
           <p:pic>
             <p:nvPicPr>
               <p:cNvPr id="48" name="잉크 47">
@@ -8304,8 +8333,8 @@
           </p:pic>
         </mc:Fallback>
       </mc:AlternateContent>
-      <mc:AlternateContent xmlns:mc="http://schemas.openxmlformats.org/markup-compatibility/2006">
-        <mc:Choice xmlns:p14="http://schemas.microsoft.com/office/powerpoint/2010/main" Requires="p14">
+      <mc:AlternateContent xmlns:mc="http://schemas.openxmlformats.org/markup-compatibility/2006" xmlns:p14="http://schemas.microsoft.com/office/powerpoint/2010/main">
+        <mc:Choice Requires="p14">
           <p:contentPart p14:bwMode="auto" r:id="rId51">
             <p14:nvContentPartPr>
               <p14:cNvPr id="49" name="잉크 48">
@@ -8324,7 +8353,7 @@
             </p14:xfrm>
           </p:contentPart>
         </mc:Choice>
-        <mc:Fallback>
+        <mc:Fallback xmlns="">
           <p:pic>
             <p:nvPicPr>
               <p:cNvPr id="49" name="잉크 48">
@@ -8355,8 +8384,8 @@
           </p:pic>
         </mc:Fallback>
       </mc:AlternateContent>
-      <mc:AlternateContent xmlns:mc="http://schemas.openxmlformats.org/markup-compatibility/2006">
-        <mc:Choice xmlns:p14="http://schemas.microsoft.com/office/powerpoint/2010/main" Requires="p14">
+      <mc:AlternateContent xmlns:mc="http://schemas.openxmlformats.org/markup-compatibility/2006" xmlns:p14="http://schemas.microsoft.com/office/powerpoint/2010/main">
+        <mc:Choice Requires="p14">
           <p:contentPart p14:bwMode="auto" r:id="rId53">
             <p14:nvContentPartPr>
               <p14:cNvPr id="51" name="잉크 50">
@@ -8375,7 +8404,7 @@
             </p14:xfrm>
           </p:contentPart>
         </mc:Choice>
-        <mc:Fallback>
+        <mc:Fallback xmlns="">
           <p:pic>
             <p:nvPicPr>
               <p:cNvPr id="51" name="잉크 50">
@@ -8406,8 +8435,8 @@
           </p:pic>
         </mc:Fallback>
       </mc:AlternateContent>
-      <mc:AlternateContent xmlns:mc="http://schemas.openxmlformats.org/markup-compatibility/2006">
-        <mc:Choice xmlns:p14="http://schemas.microsoft.com/office/powerpoint/2010/main" Requires="p14">
+      <mc:AlternateContent xmlns:mc="http://schemas.openxmlformats.org/markup-compatibility/2006" xmlns:p14="http://schemas.microsoft.com/office/powerpoint/2010/main">
+        <mc:Choice Requires="p14">
           <p:contentPart p14:bwMode="auto" r:id="rId55">
             <p14:nvContentPartPr>
               <p14:cNvPr id="52" name="잉크 51">
@@ -8426,7 +8455,7 @@
             </p14:xfrm>
           </p:contentPart>
         </mc:Choice>
-        <mc:Fallback>
+        <mc:Fallback xmlns="">
           <p:pic>
             <p:nvPicPr>
               <p:cNvPr id="52" name="잉크 51">
@@ -8457,8 +8486,8 @@
           </p:pic>
         </mc:Fallback>
       </mc:AlternateContent>
-      <mc:AlternateContent xmlns:mc="http://schemas.openxmlformats.org/markup-compatibility/2006">
-        <mc:Choice xmlns:p14="http://schemas.microsoft.com/office/powerpoint/2010/main" Requires="p14">
+      <mc:AlternateContent xmlns:mc="http://schemas.openxmlformats.org/markup-compatibility/2006" xmlns:p14="http://schemas.microsoft.com/office/powerpoint/2010/main">
+        <mc:Choice Requires="p14">
           <p:contentPart p14:bwMode="auto" r:id="rId57">
             <p14:nvContentPartPr>
               <p14:cNvPr id="54" name="잉크 53">
@@ -8477,7 +8506,7 @@
             </p14:xfrm>
           </p:contentPart>
         </mc:Choice>
-        <mc:Fallback>
+        <mc:Fallback xmlns="">
           <p:pic>
             <p:nvPicPr>
               <p:cNvPr id="54" name="잉크 53">
@@ -8508,8 +8537,8 @@
           </p:pic>
         </mc:Fallback>
       </mc:AlternateContent>
-      <mc:AlternateContent xmlns:mc="http://schemas.openxmlformats.org/markup-compatibility/2006">
-        <mc:Choice xmlns:p14="http://schemas.microsoft.com/office/powerpoint/2010/main" Requires="p14">
+      <mc:AlternateContent xmlns:mc="http://schemas.openxmlformats.org/markup-compatibility/2006" xmlns:p14="http://schemas.microsoft.com/office/powerpoint/2010/main">
+        <mc:Choice Requires="p14">
           <p:contentPart p14:bwMode="auto" r:id="rId59">
             <p14:nvContentPartPr>
               <p14:cNvPr id="55" name="잉크 54">
@@ -8528,7 +8557,7 @@
             </p14:xfrm>
           </p:contentPart>
         </mc:Choice>
-        <mc:Fallback>
+        <mc:Fallback xmlns="">
           <p:pic>
             <p:nvPicPr>
               <p:cNvPr id="55" name="잉크 54">
@@ -8559,8 +8588,8 @@
           </p:pic>
         </mc:Fallback>
       </mc:AlternateContent>
-      <mc:AlternateContent xmlns:mc="http://schemas.openxmlformats.org/markup-compatibility/2006">
-        <mc:Choice xmlns:p14="http://schemas.microsoft.com/office/powerpoint/2010/main" Requires="p14">
+      <mc:AlternateContent xmlns:mc="http://schemas.openxmlformats.org/markup-compatibility/2006" xmlns:p14="http://schemas.microsoft.com/office/powerpoint/2010/main">
+        <mc:Choice Requires="p14">
           <p:contentPart p14:bwMode="auto" r:id="rId61">
             <p14:nvContentPartPr>
               <p14:cNvPr id="56" name="잉크 55">
@@ -8579,7 +8608,7 @@
             </p14:xfrm>
           </p:contentPart>
         </mc:Choice>
-        <mc:Fallback>
+        <mc:Fallback xmlns="">
           <p:pic>
             <p:nvPicPr>
               <p:cNvPr id="56" name="잉크 55">
@@ -8610,8 +8639,8 @@
           </p:pic>
         </mc:Fallback>
       </mc:AlternateContent>
-      <mc:AlternateContent xmlns:mc="http://schemas.openxmlformats.org/markup-compatibility/2006">
-        <mc:Choice xmlns:p14="http://schemas.microsoft.com/office/powerpoint/2010/main" Requires="p14">
+      <mc:AlternateContent xmlns:mc="http://schemas.openxmlformats.org/markup-compatibility/2006" xmlns:p14="http://schemas.microsoft.com/office/powerpoint/2010/main">
+        <mc:Choice Requires="p14">
           <p:contentPart p14:bwMode="auto" r:id="rId63">
             <p14:nvContentPartPr>
               <p14:cNvPr id="57" name="잉크 56">
@@ -8630,7 +8659,7 @@
             </p14:xfrm>
           </p:contentPart>
         </mc:Choice>
-        <mc:Fallback>
+        <mc:Fallback xmlns="">
           <p:pic>
             <p:nvPicPr>
               <p:cNvPr id="57" name="잉크 56">
@@ -8661,8 +8690,8 @@
           </p:pic>
         </mc:Fallback>
       </mc:AlternateContent>
-      <mc:AlternateContent xmlns:mc="http://schemas.openxmlformats.org/markup-compatibility/2006">
-        <mc:Choice xmlns:p14="http://schemas.microsoft.com/office/powerpoint/2010/main" Requires="p14">
+      <mc:AlternateContent xmlns:mc="http://schemas.openxmlformats.org/markup-compatibility/2006" xmlns:p14="http://schemas.microsoft.com/office/powerpoint/2010/main">
+        <mc:Choice Requires="p14">
           <p:contentPart p14:bwMode="auto" r:id="rId65">
             <p14:nvContentPartPr>
               <p14:cNvPr id="59" name="잉크 58">
@@ -8681,7 +8710,7 @@
             </p14:xfrm>
           </p:contentPart>
         </mc:Choice>
-        <mc:Fallback>
+        <mc:Fallback xmlns="">
           <p:pic>
             <p:nvPicPr>
               <p:cNvPr id="59" name="잉크 58">
@@ -8712,8 +8741,8 @@
           </p:pic>
         </mc:Fallback>
       </mc:AlternateContent>
-      <mc:AlternateContent xmlns:mc="http://schemas.openxmlformats.org/markup-compatibility/2006">
-        <mc:Choice xmlns:p14="http://schemas.microsoft.com/office/powerpoint/2010/main" Requires="p14">
+      <mc:AlternateContent xmlns:mc="http://schemas.openxmlformats.org/markup-compatibility/2006" xmlns:p14="http://schemas.microsoft.com/office/powerpoint/2010/main">
+        <mc:Choice Requires="p14">
           <p:contentPart p14:bwMode="auto" r:id="rId67">
             <p14:nvContentPartPr>
               <p14:cNvPr id="60" name="잉크 59">
@@ -8732,7 +8761,7 @@
             </p14:xfrm>
           </p:contentPart>
         </mc:Choice>
-        <mc:Fallback>
+        <mc:Fallback xmlns="">
           <p:pic>
             <p:nvPicPr>
               <p:cNvPr id="60" name="잉크 59">
@@ -8763,8 +8792,8 @@
           </p:pic>
         </mc:Fallback>
       </mc:AlternateContent>
-      <mc:AlternateContent xmlns:mc="http://schemas.openxmlformats.org/markup-compatibility/2006">
-        <mc:Choice xmlns:p14="http://schemas.microsoft.com/office/powerpoint/2010/main" Requires="p14">
+      <mc:AlternateContent xmlns:mc="http://schemas.openxmlformats.org/markup-compatibility/2006" xmlns:p14="http://schemas.microsoft.com/office/powerpoint/2010/main">
+        <mc:Choice Requires="p14">
           <p:contentPart p14:bwMode="auto" r:id="rId69">
             <p14:nvContentPartPr>
               <p14:cNvPr id="61" name="잉크 60">
@@ -8783,7 +8812,7 @@
             </p14:xfrm>
           </p:contentPart>
         </mc:Choice>
-        <mc:Fallback>
+        <mc:Fallback xmlns="">
           <p:pic>
             <p:nvPicPr>
               <p:cNvPr id="61" name="잉크 60">
@@ -8814,8 +8843,8 @@
           </p:pic>
         </mc:Fallback>
       </mc:AlternateContent>
-      <mc:AlternateContent xmlns:mc="http://schemas.openxmlformats.org/markup-compatibility/2006">
-        <mc:Choice xmlns:p14="http://schemas.microsoft.com/office/powerpoint/2010/main" Requires="p14">
+      <mc:AlternateContent xmlns:mc="http://schemas.openxmlformats.org/markup-compatibility/2006" xmlns:p14="http://schemas.microsoft.com/office/powerpoint/2010/main">
+        <mc:Choice Requires="p14">
           <p:contentPart p14:bwMode="auto" r:id="rId71">
             <p14:nvContentPartPr>
               <p14:cNvPr id="62" name="잉크 61">
@@ -8834,7 +8863,7 @@
             </p14:xfrm>
           </p:contentPart>
         </mc:Choice>
-        <mc:Fallback>
+        <mc:Fallback xmlns="">
           <p:pic>
             <p:nvPicPr>
               <p:cNvPr id="62" name="잉크 61">
@@ -8865,8 +8894,8 @@
           </p:pic>
         </mc:Fallback>
       </mc:AlternateContent>
-      <mc:AlternateContent xmlns:mc="http://schemas.openxmlformats.org/markup-compatibility/2006">
-        <mc:Choice xmlns:p14="http://schemas.microsoft.com/office/powerpoint/2010/main" Requires="p14">
+      <mc:AlternateContent xmlns:mc="http://schemas.openxmlformats.org/markup-compatibility/2006" xmlns:p14="http://schemas.microsoft.com/office/powerpoint/2010/main">
+        <mc:Choice Requires="p14">
           <p:contentPart p14:bwMode="auto" r:id="rId73">
             <p14:nvContentPartPr>
               <p14:cNvPr id="63" name="잉크 62">
@@ -8885,7 +8914,7 @@
             </p14:xfrm>
           </p:contentPart>
         </mc:Choice>
-        <mc:Fallback>
+        <mc:Fallback xmlns="">
           <p:pic>
             <p:nvPicPr>
               <p:cNvPr id="63" name="잉크 62">
@@ -8916,8 +8945,8 @@
           </p:pic>
         </mc:Fallback>
       </mc:AlternateContent>
-      <mc:AlternateContent xmlns:mc="http://schemas.openxmlformats.org/markup-compatibility/2006">
-        <mc:Choice xmlns:p14="http://schemas.microsoft.com/office/powerpoint/2010/main" Requires="p14">
+      <mc:AlternateContent xmlns:mc="http://schemas.openxmlformats.org/markup-compatibility/2006" xmlns:p14="http://schemas.microsoft.com/office/powerpoint/2010/main">
+        <mc:Choice Requires="p14">
           <p:contentPart p14:bwMode="auto" r:id="rId75">
             <p14:nvContentPartPr>
               <p14:cNvPr id="67" name="잉크 66">
@@ -8936,7 +8965,7 @@
             </p14:xfrm>
           </p:contentPart>
         </mc:Choice>
-        <mc:Fallback>
+        <mc:Fallback xmlns="">
           <p:pic>
             <p:nvPicPr>
               <p:cNvPr id="67" name="잉크 66">
@@ -8967,8 +8996,8 @@
           </p:pic>
         </mc:Fallback>
       </mc:AlternateContent>
-      <mc:AlternateContent xmlns:mc="http://schemas.openxmlformats.org/markup-compatibility/2006">
-        <mc:Choice xmlns:p14="http://schemas.microsoft.com/office/powerpoint/2010/main" Requires="p14">
+      <mc:AlternateContent xmlns:mc="http://schemas.openxmlformats.org/markup-compatibility/2006" xmlns:p14="http://schemas.microsoft.com/office/powerpoint/2010/main">
+        <mc:Choice Requires="p14">
           <p:contentPart p14:bwMode="auto" r:id="rId77">
             <p14:nvContentPartPr>
               <p14:cNvPr id="68" name="잉크 67">
@@ -8987,7 +9016,7 @@
             </p14:xfrm>
           </p:contentPart>
         </mc:Choice>
-        <mc:Fallback>
+        <mc:Fallback xmlns="">
           <p:pic>
             <p:nvPicPr>
               <p:cNvPr id="68" name="잉크 67">
@@ -9018,8 +9047,8 @@
           </p:pic>
         </mc:Fallback>
       </mc:AlternateContent>
-      <mc:AlternateContent xmlns:mc="http://schemas.openxmlformats.org/markup-compatibility/2006">
-        <mc:Choice xmlns:p14="http://schemas.microsoft.com/office/powerpoint/2010/main" Requires="p14">
+      <mc:AlternateContent xmlns:mc="http://schemas.openxmlformats.org/markup-compatibility/2006" xmlns:p14="http://schemas.microsoft.com/office/powerpoint/2010/main">
+        <mc:Choice Requires="p14">
           <p:contentPart p14:bwMode="auto" r:id="rId79">
             <p14:nvContentPartPr>
               <p14:cNvPr id="70" name="잉크 69">
@@ -9038,7 +9067,7 @@
             </p14:xfrm>
           </p:contentPart>
         </mc:Choice>
-        <mc:Fallback>
+        <mc:Fallback xmlns="">
           <p:pic>
             <p:nvPicPr>
               <p:cNvPr id="70" name="잉크 69">
@@ -9069,8 +9098,8 @@
           </p:pic>
         </mc:Fallback>
       </mc:AlternateContent>
-      <mc:AlternateContent xmlns:mc="http://schemas.openxmlformats.org/markup-compatibility/2006">
-        <mc:Choice xmlns:p14="http://schemas.microsoft.com/office/powerpoint/2010/main" Requires="p14">
+      <mc:AlternateContent xmlns:mc="http://schemas.openxmlformats.org/markup-compatibility/2006" xmlns:p14="http://schemas.microsoft.com/office/powerpoint/2010/main">
+        <mc:Choice Requires="p14">
           <p:contentPart p14:bwMode="auto" r:id="rId81">
             <p14:nvContentPartPr>
               <p14:cNvPr id="72" name="잉크 71">
@@ -9089,7 +9118,7 @@
             </p14:xfrm>
           </p:contentPart>
         </mc:Choice>
-        <mc:Fallback>
+        <mc:Fallback xmlns="">
           <p:pic>
             <p:nvPicPr>
               <p:cNvPr id="72" name="잉크 71">
@@ -9120,8 +9149,8 @@
           </p:pic>
         </mc:Fallback>
       </mc:AlternateContent>
-      <mc:AlternateContent xmlns:mc="http://schemas.openxmlformats.org/markup-compatibility/2006">
-        <mc:Choice xmlns:p14="http://schemas.microsoft.com/office/powerpoint/2010/main" Requires="p14">
+      <mc:AlternateContent xmlns:mc="http://schemas.openxmlformats.org/markup-compatibility/2006" xmlns:p14="http://schemas.microsoft.com/office/powerpoint/2010/main">
+        <mc:Choice Requires="p14">
           <p:contentPart p14:bwMode="auto" r:id="rId83">
             <p14:nvContentPartPr>
               <p14:cNvPr id="74" name="잉크 73">
@@ -9140,7 +9169,7 @@
             </p14:xfrm>
           </p:contentPart>
         </mc:Choice>
-        <mc:Fallback>
+        <mc:Fallback xmlns="">
           <p:pic>
             <p:nvPicPr>
               <p:cNvPr id="74" name="잉크 73">
@@ -9191,8 +9220,8 @@
             <a:chExt cx="4204080" cy="3160440"/>
           </a:xfrm>
         </p:grpSpPr>
-        <mc:AlternateContent xmlns:mc="http://schemas.openxmlformats.org/markup-compatibility/2006">
-          <mc:Choice xmlns:p14="http://schemas.microsoft.com/office/powerpoint/2010/main" Requires="p14">
+        <mc:AlternateContent xmlns:mc="http://schemas.openxmlformats.org/markup-compatibility/2006" xmlns:p14="http://schemas.microsoft.com/office/powerpoint/2010/main">
+          <mc:Choice Requires="p14">
             <p:contentPart p14:bwMode="auto" r:id="rId85">
               <p14:nvContentPartPr>
                 <p14:cNvPr id="64" name="잉크 63">
@@ -9211,7 +9240,7 @@
               </p14:xfrm>
             </p:contentPart>
           </mc:Choice>
-          <mc:Fallback>
+          <mc:Fallback xmlns="">
             <p:pic>
               <p:nvPicPr>
                 <p:cNvPr id="64" name="잉크 63">
@@ -9242,8 +9271,8 @@
             </p:pic>
           </mc:Fallback>
         </mc:AlternateContent>
-        <mc:AlternateContent xmlns:mc="http://schemas.openxmlformats.org/markup-compatibility/2006">
-          <mc:Choice xmlns:p14="http://schemas.microsoft.com/office/powerpoint/2010/main" Requires="p14">
+        <mc:AlternateContent xmlns:mc="http://schemas.openxmlformats.org/markup-compatibility/2006" xmlns:p14="http://schemas.microsoft.com/office/powerpoint/2010/main">
+          <mc:Choice Requires="p14">
             <p:contentPart p14:bwMode="auto" r:id="rId87">
               <p14:nvContentPartPr>
                 <p14:cNvPr id="65" name="잉크 64">
@@ -9262,7 +9291,7 @@
               </p14:xfrm>
             </p:contentPart>
           </mc:Choice>
-          <mc:Fallback>
+          <mc:Fallback xmlns="">
             <p:pic>
               <p:nvPicPr>
                 <p:cNvPr id="65" name="잉크 64">
@@ -9293,8 +9322,8 @@
             </p:pic>
           </mc:Fallback>
         </mc:AlternateContent>
-        <mc:AlternateContent xmlns:mc="http://schemas.openxmlformats.org/markup-compatibility/2006">
-          <mc:Choice xmlns:p14="http://schemas.microsoft.com/office/powerpoint/2010/main" Requires="p14">
+        <mc:AlternateContent xmlns:mc="http://schemas.openxmlformats.org/markup-compatibility/2006" xmlns:p14="http://schemas.microsoft.com/office/powerpoint/2010/main">
+          <mc:Choice Requires="p14">
             <p:contentPart p14:bwMode="auto" r:id="rId89">
               <p14:nvContentPartPr>
                 <p14:cNvPr id="76" name="잉크 75">
@@ -9313,7 +9342,7 @@
               </p14:xfrm>
             </p:contentPart>
           </mc:Choice>
-          <mc:Fallback>
+          <mc:Fallback xmlns="">
             <p:pic>
               <p:nvPicPr>
                 <p:cNvPr id="76" name="잉크 75">
@@ -9344,8 +9373,8 @@
             </p:pic>
           </mc:Fallback>
         </mc:AlternateContent>
-        <mc:AlternateContent xmlns:mc="http://schemas.openxmlformats.org/markup-compatibility/2006">
-          <mc:Choice xmlns:p14="http://schemas.microsoft.com/office/powerpoint/2010/main" Requires="p14">
+        <mc:AlternateContent xmlns:mc="http://schemas.openxmlformats.org/markup-compatibility/2006" xmlns:p14="http://schemas.microsoft.com/office/powerpoint/2010/main">
+          <mc:Choice Requires="p14">
             <p:contentPart p14:bwMode="auto" r:id="rId91">
               <p14:nvContentPartPr>
                 <p14:cNvPr id="78" name="잉크 77">
@@ -9364,7 +9393,7 @@
               </p14:xfrm>
             </p:contentPart>
           </mc:Choice>
-          <mc:Fallback>
+          <mc:Fallback xmlns="">
             <p:pic>
               <p:nvPicPr>
                 <p:cNvPr id="78" name="잉크 77">
@@ -9446,8 +9475,8 @@
             <a:chExt cx="3240" cy="3240"/>
           </a:xfrm>
         </p:grpSpPr>
-        <mc:AlternateContent xmlns:mc="http://schemas.openxmlformats.org/markup-compatibility/2006">
-          <mc:Choice xmlns:p14="http://schemas.microsoft.com/office/powerpoint/2010/main" Requires="p14">
+        <mc:AlternateContent xmlns:mc="http://schemas.openxmlformats.org/markup-compatibility/2006" xmlns:p14="http://schemas.microsoft.com/office/powerpoint/2010/main">
+          <mc:Choice Requires="p14">
             <p:contentPart p14:bwMode="auto" r:id="rId2">
               <p14:nvContentPartPr>
                 <p14:cNvPr id="2" name="잉크 1">
@@ -9466,7 +9495,7 @@
               </p14:xfrm>
             </p:contentPart>
           </mc:Choice>
-          <mc:Fallback>
+          <mc:Fallback xmlns="">
             <p:pic>
               <p:nvPicPr>
                 <p:cNvPr id="2" name="잉크 1">
@@ -9497,8 +9526,8 @@
             </p:pic>
           </mc:Fallback>
         </mc:AlternateContent>
-        <mc:AlternateContent xmlns:mc="http://schemas.openxmlformats.org/markup-compatibility/2006">
-          <mc:Choice xmlns:p14="http://schemas.microsoft.com/office/powerpoint/2010/main" Requires="p14">
+        <mc:AlternateContent xmlns:mc="http://schemas.openxmlformats.org/markup-compatibility/2006" xmlns:p14="http://schemas.microsoft.com/office/powerpoint/2010/main">
+          <mc:Choice Requires="p14">
             <p:contentPart p14:bwMode="auto" r:id="rId4">
               <p14:nvContentPartPr>
                 <p14:cNvPr id="3" name="잉크 2">
@@ -9517,7 +9546,7 @@
               </p14:xfrm>
             </p:contentPart>
           </mc:Choice>
-          <mc:Fallback>
+          <mc:Fallback xmlns="">
             <p:pic>
               <p:nvPicPr>
                 <p:cNvPr id="3" name="잉크 2">
@@ -9549,8 +9578,8 @@
           </mc:Fallback>
         </mc:AlternateContent>
       </p:grpSp>
-      <mc:AlternateContent xmlns:mc="http://schemas.openxmlformats.org/markup-compatibility/2006">
-        <mc:Choice xmlns:p14="http://schemas.microsoft.com/office/powerpoint/2010/main" Requires="p14">
+      <mc:AlternateContent xmlns:mc="http://schemas.openxmlformats.org/markup-compatibility/2006" xmlns:p14="http://schemas.microsoft.com/office/powerpoint/2010/main">
+        <mc:Choice Requires="p14">
           <p:contentPart p14:bwMode="auto" r:id="rId5">
             <p14:nvContentPartPr>
               <p14:cNvPr id="5" name="잉크 4">
@@ -9569,7 +9598,7 @@
             </p14:xfrm>
           </p:contentPart>
         </mc:Choice>
-        <mc:Fallback>
+        <mc:Fallback xmlns="">
           <p:pic>
             <p:nvPicPr>
               <p:cNvPr id="5" name="잉크 4">
@@ -11337,8 +11366,12 @@
           </a:p>
           <a:p>
             <a:r>
+              <a:rPr kumimoji="1" lang="en-US" altLang="ko-Kore-KR" sz="4000"/>
+              <a:t>Parsing</a:t>
+            </a:r>
+            <a:r>
               <a:rPr kumimoji="1" lang="en-US" altLang="ko-Kore-KR" sz="4000" dirty="0" err="1"/>
-              <a:t>Pasring_case.py</a:t>
+              <a:t>_case.py</a:t>
             </a:r>
             <a:endParaRPr kumimoji="1" lang="en-US" altLang="ko-Kore-KR" sz="4000" dirty="0"/>
           </a:p>
@@ -11739,8 +11772,8 @@
           </a:p>
         </p:txBody>
       </p:sp>
-      <mc:AlternateContent xmlns:mc="http://schemas.openxmlformats.org/markup-compatibility/2006">
-        <mc:Choice xmlns:p14="http://schemas.microsoft.com/office/powerpoint/2010/main" Requires="p14">
+      <mc:AlternateContent xmlns:mc="http://schemas.openxmlformats.org/markup-compatibility/2006" xmlns:p14="http://schemas.microsoft.com/office/powerpoint/2010/main">
+        <mc:Choice Requires="p14">
           <p:contentPart p14:bwMode="auto" r:id="rId3">
             <p14:nvContentPartPr>
               <p14:cNvPr id="12" name="잉크 11">
@@ -11759,7 +11792,7 @@
             </p14:xfrm>
           </p:contentPart>
         </mc:Choice>
-        <mc:Fallback>
+        <mc:Fallback xmlns="">
           <p:pic>
             <p:nvPicPr>
               <p:cNvPr id="12" name="잉크 11">
@@ -11790,8 +11823,8 @@
           </p:pic>
         </mc:Fallback>
       </mc:AlternateContent>
-      <mc:AlternateContent xmlns:mc="http://schemas.openxmlformats.org/markup-compatibility/2006">
-        <mc:Choice xmlns:p14="http://schemas.microsoft.com/office/powerpoint/2010/main" Requires="p14">
+      <mc:AlternateContent xmlns:mc="http://schemas.openxmlformats.org/markup-compatibility/2006" xmlns:p14="http://schemas.microsoft.com/office/powerpoint/2010/main">
+        <mc:Choice Requires="p14">
           <p:contentPart p14:bwMode="auto" r:id="rId5">
             <p14:nvContentPartPr>
               <p14:cNvPr id="14" name="잉크 13">
@@ -11810,7 +11843,7 @@
             </p14:xfrm>
           </p:contentPart>
         </mc:Choice>
-        <mc:Fallback>
+        <mc:Fallback xmlns="">
           <p:pic>
             <p:nvPicPr>
               <p:cNvPr id="14" name="잉크 13">
@@ -11841,8 +11874,8 @@
           </p:pic>
         </mc:Fallback>
       </mc:AlternateContent>
-      <mc:AlternateContent xmlns:mc="http://schemas.openxmlformats.org/markup-compatibility/2006">
-        <mc:Choice xmlns:p14="http://schemas.microsoft.com/office/powerpoint/2010/main" Requires="p14">
+      <mc:AlternateContent xmlns:mc="http://schemas.openxmlformats.org/markup-compatibility/2006" xmlns:p14="http://schemas.microsoft.com/office/powerpoint/2010/main">
+        <mc:Choice Requires="p14">
           <p:contentPart p14:bwMode="auto" r:id="rId7">
             <p14:nvContentPartPr>
               <p14:cNvPr id="16" name="잉크 15">
@@ -11861,7 +11894,7 @@
             </p14:xfrm>
           </p:contentPart>
         </mc:Choice>
-        <mc:Fallback>
+        <mc:Fallback xmlns="">
           <p:pic>
             <p:nvPicPr>
               <p:cNvPr id="16" name="잉크 15">
@@ -11892,8 +11925,8 @@
           </p:pic>
         </mc:Fallback>
       </mc:AlternateContent>
-      <mc:AlternateContent xmlns:mc="http://schemas.openxmlformats.org/markup-compatibility/2006">
-        <mc:Choice xmlns:p14="http://schemas.microsoft.com/office/powerpoint/2010/main" Requires="p14">
+      <mc:AlternateContent xmlns:mc="http://schemas.openxmlformats.org/markup-compatibility/2006" xmlns:p14="http://schemas.microsoft.com/office/powerpoint/2010/main">
+        <mc:Choice Requires="p14">
           <p:contentPart p14:bwMode="auto" r:id="rId9">
             <p14:nvContentPartPr>
               <p14:cNvPr id="20" name="잉크 19">
@@ -11912,7 +11945,7 @@
             </p14:xfrm>
           </p:contentPart>
         </mc:Choice>
-        <mc:Fallback>
+        <mc:Fallback xmlns="">
           <p:pic>
             <p:nvPicPr>
               <p:cNvPr id="20" name="잉크 19">
@@ -11943,8 +11976,8 @@
           </p:pic>
         </mc:Fallback>
       </mc:AlternateContent>
-      <mc:AlternateContent xmlns:mc="http://schemas.openxmlformats.org/markup-compatibility/2006">
-        <mc:Choice xmlns:p14="http://schemas.microsoft.com/office/powerpoint/2010/main" Requires="p14">
+      <mc:AlternateContent xmlns:mc="http://schemas.openxmlformats.org/markup-compatibility/2006" xmlns:p14="http://schemas.microsoft.com/office/powerpoint/2010/main">
+        <mc:Choice Requires="p14">
           <p:contentPart p14:bwMode="auto" r:id="rId11">
             <p14:nvContentPartPr>
               <p14:cNvPr id="21" name="잉크 20">
@@ -11963,7 +11996,7 @@
             </p14:xfrm>
           </p:contentPart>
         </mc:Choice>
-        <mc:Fallback>
+        <mc:Fallback xmlns="">
           <p:pic>
             <p:nvPicPr>
               <p:cNvPr id="21" name="잉크 20">
@@ -11994,8 +12027,8 @@
           </p:pic>
         </mc:Fallback>
       </mc:AlternateContent>
-      <mc:AlternateContent xmlns:mc="http://schemas.openxmlformats.org/markup-compatibility/2006">
-        <mc:Choice xmlns:p14="http://schemas.microsoft.com/office/powerpoint/2010/main" Requires="p14">
+      <mc:AlternateContent xmlns:mc="http://schemas.openxmlformats.org/markup-compatibility/2006" xmlns:p14="http://schemas.microsoft.com/office/powerpoint/2010/main">
+        <mc:Choice Requires="p14">
           <p:contentPart p14:bwMode="auto" r:id="rId13">
             <p14:nvContentPartPr>
               <p14:cNvPr id="22" name="잉크 21">
@@ -12014,7 +12047,7 @@
             </p14:xfrm>
           </p:contentPart>
         </mc:Choice>
-        <mc:Fallback>
+        <mc:Fallback xmlns="">
           <p:pic>
             <p:nvPicPr>
               <p:cNvPr id="22" name="잉크 21">
@@ -12045,8 +12078,8 @@
           </p:pic>
         </mc:Fallback>
       </mc:AlternateContent>
-      <mc:AlternateContent xmlns:mc="http://schemas.openxmlformats.org/markup-compatibility/2006">
-        <mc:Choice xmlns:p14="http://schemas.microsoft.com/office/powerpoint/2010/main" Requires="p14">
+      <mc:AlternateContent xmlns:mc="http://schemas.openxmlformats.org/markup-compatibility/2006" xmlns:p14="http://schemas.microsoft.com/office/powerpoint/2010/main">
+        <mc:Choice Requires="p14">
           <p:contentPart p14:bwMode="auto" r:id="rId15">
             <p14:nvContentPartPr>
               <p14:cNvPr id="24" name="잉크 23">
@@ -12065,7 +12098,7 @@
             </p14:xfrm>
           </p:contentPart>
         </mc:Choice>
-        <mc:Fallback>
+        <mc:Fallback xmlns="">
           <p:pic>
             <p:nvPicPr>
               <p:cNvPr id="24" name="잉크 23">
@@ -12096,8 +12129,8 @@
           </p:pic>
         </mc:Fallback>
       </mc:AlternateContent>
-      <mc:AlternateContent xmlns:mc="http://schemas.openxmlformats.org/markup-compatibility/2006">
-        <mc:Choice xmlns:p14="http://schemas.microsoft.com/office/powerpoint/2010/main" Requires="p14">
+      <mc:AlternateContent xmlns:mc="http://schemas.openxmlformats.org/markup-compatibility/2006" xmlns:p14="http://schemas.microsoft.com/office/powerpoint/2010/main">
+        <mc:Choice Requires="p14">
           <p:contentPart p14:bwMode="auto" r:id="rId17">
             <p14:nvContentPartPr>
               <p14:cNvPr id="26" name="잉크 25">
@@ -12116,7 +12149,7 @@
             </p14:xfrm>
           </p:contentPart>
         </mc:Choice>
-        <mc:Fallback>
+        <mc:Fallback xmlns="">
           <p:pic>
             <p:nvPicPr>
               <p:cNvPr id="26" name="잉크 25">
@@ -12187,8 +12220,8 @@
           </a:fontRef>
         </p:style>
       </p:cxnSp>
-      <mc:AlternateContent xmlns:mc="http://schemas.openxmlformats.org/markup-compatibility/2006">
-        <mc:Choice xmlns:p14="http://schemas.microsoft.com/office/powerpoint/2010/main" Requires="p14">
+      <mc:AlternateContent xmlns:mc="http://schemas.openxmlformats.org/markup-compatibility/2006" xmlns:p14="http://schemas.microsoft.com/office/powerpoint/2010/main">
+        <mc:Choice Requires="p14">
           <p:contentPart p14:bwMode="auto" r:id="rId19">
             <p14:nvContentPartPr>
               <p14:cNvPr id="32" name="잉크 31">
@@ -12207,7 +12240,7 @@
             </p14:xfrm>
           </p:contentPart>
         </mc:Choice>
-        <mc:Fallback>
+        <mc:Fallback xmlns="">
           <p:pic>
             <p:nvPicPr>
               <p:cNvPr id="32" name="잉크 31">
@@ -12238,8 +12271,8 @@
           </p:pic>
         </mc:Fallback>
       </mc:AlternateContent>
-      <mc:AlternateContent xmlns:mc="http://schemas.openxmlformats.org/markup-compatibility/2006">
-        <mc:Choice xmlns:p14="http://schemas.microsoft.com/office/powerpoint/2010/main" Requires="p14">
+      <mc:AlternateContent xmlns:mc="http://schemas.openxmlformats.org/markup-compatibility/2006" xmlns:p14="http://schemas.microsoft.com/office/powerpoint/2010/main">
+        <mc:Choice Requires="p14">
           <p:contentPart p14:bwMode="auto" r:id="rId21">
             <p14:nvContentPartPr>
               <p14:cNvPr id="33" name="잉크 32">
@@ -12258,7 +12291,7 @@
             </p14:xfrm>
           </p:contentPart>
         </mc:Choice>
-        <mc:Fallback>
+        <mc:Fallback xmlns="">
           <p:pic>
             <p:nvPicPr>
               <p:cNvPr id="33" name="잉크 32">
@@ -12289,8 +12322,8 @@
           </p:pic>
         </mc:Fallback>
       </mc:AlternateContent>
-      <mc:AlternateContent xmlns:mc="http://schemas.openxmlformats.org/markup-compatibility/2006">
-        <mc:Choice xmlns:p14="http://schemas.microsoft.com/office/powerpoint/2010/main" Requires="p14">
+      <mc:AlternateContent xmlns:mc="http://schemas.openxmlformats.org/markup-compatibility/2006" xmlns:p14="http://schemas.microsoft.com/office/powerpoint/2010/main">
+        <mc:Choice Requires="p14">
           <p:contentPart p14:bwMode="auto" r:id="rId23">
             <p14:nvContentPartPr>
               <p14:cNvPr id="34" name="잉크 33">
@@ -12309,7 +12342,7 @@
             </p14:xfrm>
           </p:contentPart>
         </mc:Choice>
-        <mc:Fallback>
+        <mc:Fallback xmlns="">
           <p:pic>
             <p:nvPicPr>
               <p:cNvPr id="34" name="잉크 33">
@@ -12340,8 +12373,8 @@
           </p:pic>
         </mc:Fallback>
       </mc:AlternateContent>
-      <mc:AlternateContent xmlns:mc="http://schemas.openxmlformats.org/markup-compatibility/2006">
-        <mc:Choice xmlns:p14="http://schemas.microsoft.com/office/powerpoint/2010/main" Requires="p14">
+      <mc:AlternateContent xmlns:mc="http://schemas.openxmlformats.org/markup-compatibility/2006" xmlns:p14="http://schemas.microsoft.com/office/powerpoint/2010/main">
+        <mc:Choice Requires="p14">
           <p:contentPart p14:bwMode="auto" r:id="rId25">
             <p14:nvContentPartPr>
               <p14:cNvPr id="35" name="잉크 34">
@@ -12360,7 +12393,7 @@
             </p14:xfrm>
           </p:contentPart>
         </mc:Choice>
-        <mc:Fallback>
+        <mc:Fallback xmlns="">
           <p:pic>
             <p:nvPicPr>
               <p:cNvPr id="35" name="잉크 34">
@@ -12391,8 +12424,8 @@
           </p:pic>
         </mc:Fallback>
       </mc:AlternateContent>
-      <mc:AlternateContent xmlns:mc="http://schemas.openxmlformats.org/markup-compatibility/2006">
-        <mc:Choice xmlns:p14="http://schemas.microsoft.com/office/powerpoint/2010/main" Requires="p14">
+      <mc:AlternateContent xmlns:mc="http://schemas.openxmlformats.org/markup-compatibility/2006" xmlns:p14="http://schemas.microsoft.com/office/powerpoint/2010/main">
+        <mc:Choice Requires="p14">
           <p:contentPart p14:bwMode="auto" r:id="rId27">
             <p14:nvContentPartPr>
               <p14:cNvPr id="36" name="잉크 35">
@@ -12411,7 +12444,7 @@
             </p14:xfrm>
           </p:contentPart>
         </mc:Choice>
-        <mc:Fallback>
+        <mc:Fallback xmlns="">
           <p:pic>
             <p:nvPicPr>
               <p:cNvPr id="36" name="잉크 35">
@@ -12442,8 +12475,8 @@
           </p:pic>
         </mc:Fallback>
       </mc:AlternateContent>
-      <mc:AlternateContent xmlns:mc="http://schemas.openxmlformats.org/markup-compatibility/2006">
-        <mc:Choice xmlns:p14="http://schemas.microsoft.com/office/powerpoint/2010/main" Requires="p14">
+      <mc:AlternateContent xmlns:mc="http://schemas.openxmlformats.org/markup-compatibility/2006" xmlns:p14="http://schemas.microsoft.com/office/powerpoint/2010/main">
+        <mc:Choice Requires="p14">
           <p:contentPart p14:bwMode="auto" r:id="rId29">
             <p14:nvContentPartPr>
               <p14:cNvPr id="39" name="잉크 38">
@@ -12462,7 +12495,7 @@
             </p14:xfrm>
           </p:contentPart>
         </mc:Choice>
-        <mc:Fallback>
+        <mc:Fallback xmlns="">
           <p:pic>
             <p:nvPicPr>
               <p:cNvPr id="39" name="잉크 38">
@@ -12493,8 +12526,8 @@
           </p:pic>
         </mc:Fallback>
       </mc:AlternateContent>
-      <mc:AlternateContent xmlns:mc="http://schemas.openxmlformats.org/markup-compatibility/2006">
-        <mc:Choice xmlns:p14="http://schemas.microsoft.com/office/powerpoint/2010/main" Requires="p14">
+      <mc:AlternateContent xmlns:mc="http://schemas.openxmlformats.org/markup-compatibility/2006" xmlns:p14="http://schemas.microsoft.com/office/powerpoint/2010/main">
+        <mc:Choice Requires="p14">
           <p:contentPart p14:bwMode="auto" r:id="rId31">
             <p14:nvContentPartPr>
               <p14:cNvPr id="40" name="잉크 39">
@@ -12513,7 +12546,7 @@
             </p14:xfrm>
           </p:contentPart>
         </mc:Choice>
-        <mc:Fallback>
+        <mc:Fallback xmlns="">
           <p:pic>
             <p:nvPicPr>
               <p:cNvPr id="40" name="잉크 39">
@@ -12564,8 +12597,8 @@
             <a:chExt cx="906840" cy="1774080"/>
           </a:xfrm>
         </p:grpSpPr>
-        <mc:AlternateContent xmlns:mc="http://schemas.openxmlformats.org/markup-compatibility/2006">
-          <mc:Choice xmlns:p14="http://schemas.microsoft.com/office/powerpoint/2010/main" Requires="p14">
+        <mc:AlternateContent xmlns:mc="http://schemas.openxmlformats.org/markup-compatibility/2006" xmlns:p14="http://schemas.microsoft.com/office/powerpoint/2010/main">
+          <mc:Choice Requires="p14">
             <p:contentPart p14:bwMode="auto" r:id="rId33">
               <p14:nvContentPartPr>
                 <p14:cNvPr id="41" name="잉크 40">
@@ -12584,7 +12617,7 @@
               </p14:xfrm>
             </p:contentPart>
           </mc:Choice>
-          <mc:Fallback>
+          <mc:Fallback xmlns="">
             <p:pic>
               <p:nvPicPr>
                 <p:cNvPr id="41" name="잉크 40">
@@ -12615,8 +12648,8 @@
             </p:pic>
           </mc:Fallback>
         </mc:AlternateContent>
-        <mc:AlternateContent xmlns:mc="http://schemas.openxmlformats.org/markup-compatibility/2006">
-          <mc:Choice xmlns:p14="http://schemas.microsoft.com/office/powerpoint/2010/main" Requires="p14">
+        <mc:AlternateContent xmlns:mc="http://schemas.openxmlformats.org/markup-compatibility/2006" xmlns:p14="http://schemas.microsoft.com/office/powerpoint/2010/main">
+          <mc:Choice Requires="p14">
             <p:contentPart p14:bwMode="auto" r:id="rId35">
               <p14:nvContentPartPr>
                 <p14:cNvPr id="42" name="잉크 41">
@@ -12635,7 +12668,7 @@
               </p14:xfrm>
             </p:contentPart>
           </mc:Choice>
-          <mc:Fallback>
+          <mc:Fallback xmlns="">
             <p:pic>
               <p:nvPicPr>
                 <p:cNvPr id="42" name="잉크 41">
@@ -12667,8 +12700,8 @@
           </mc:Fallback>
         </mc:AlternateContent>
       </p:grpSp>
-      <mc:AlternateContent xmlns:mc="http://schemas.openxmlformats.org/markup-compatibility/2006">
-        <mc:Choice xmlns:p14="http://schemas.microsoft.com/office/powerpoint/2010/main" Requires="p14">
+      <mc:AlternateContent xmlns:mc="http://schemas.openxmlformats.org/markup-compatibility/2006" xmlns:p14="http://schemas.microsoft.com/office/powerpoint/2010/main">
+        <mc:Choice Requires="p14">
           <p:contentPart p14:bwMode="auto" r:id="rId37">
             <p14:nvContentPartPr>
               <p14:cNvPr id="44" name="잉크 43">
@@ -12687,7 +12720,7 @@
             </p14:xfrm>
           </p:contentPart>
         </mc:Choice>
-        <mc:Fallback>
+        <mc:Fallback xmlns="">
           <p:pic>
             <p:nvPicPr>
               <p:cNvPr id="44" name="잉크 43">
@@ -12718,8 +12751,8 @@
           </p:pic>
         </mc:Fallback>
       </mc:AlternateContent>
-      <mc:AlternateContent xmlns:mc="http://schemas.openxmlformats.org/markup-compatibility/2006">
-        <mc:Choice xmlns:p14="http://schemas.microsoft.com/office/powerpoint/2010/main" Requires="p14">
+      <mc:AlternateContent xmlns:mc="http://schemas.openxmlformats.org/markup-compatibility/2006" xmlns:p14="http://schemas.microsoft.com/office/powerpoint/2010/main">
+        <mc:Choice Requires="p14">
           <p:contentPart p14:bwMode="auto" r:id="rId39">
             <p14:nvContentPartPr>
               <p14:cNvPr id="4" name="잉크 3">
@@ -12738,7 +12771,7 @@
             </p14:xfrm>
           </p:contentPart>
         </mc:Choice>
-        <mc:Fallback>
+        <mc:Fallback xmlns="">
           <p:pic>
             <p:nvPicPr>
               <p:cNvPr id="4" name="잉크 3">
@@ -12826,8 +12859,8 @@
           </a:p>
         </p:txBody>
       </p:sp>
-      <mc:AlternateContent xmlns:mc="http://schemas.openxmlformats.org/markup-compatibility/2006">
-        <mc:Choice xmlns:p14="http://schemas.microsoft.com/office/powerpoint/2010/main" xmlns:aink="http://schemas.microsoft.com/office/drawing/2016/ink" Requires="p14 aink">
+      <mc:AlternateContent xmlns:mc="http://schemas.openxmlformats.org/markup-compatibility/2006" xmlns:p14="http://schemas.microsoft.com/office/powerpoint/2010/main" xmlns:aink="http://schemas.microsoft.com/office/drawing/2016/ink">
+        <mc:Choice Requires="p14 aink">
           <p:contentPart p14:bwMode="auto" r:id="rId41">
             <p14:nvContentPartPr>
               <p14:cNvPr id="31" name="잉크 30">
@@ -12846,7 +12879,7 @@
             </p14:xfrm>
           </p:contentPart>
         </mc:Choice>
-        <mc:Fallback>
+        <mc:Fallback xmlns="">
           <p:pic>
             <p:nvPicPr>
               <p:cNvPr id="31" name="잉크 30">
@@ -12877,8 +12910,8 @@
           </p:pic>
         </mc:Fallback>
       </mc:AlternateContent>
-      <mc:AlternateContent xmlns:mc="http://schemas.openxmlformats.org/markup-compatibility/2006">
-        <mc:Choice xmlns:p14="http://schemas.microsoft.com/office/powerpoint/2010/main" xmlns:aink="http://schemas.microsoft.com/office/drawing/2016/ink" Requires="p14 aink">
+      <mc:AlternateContent xmlns:mc="http://schemas.openxmlformats.org/markup-compatibility/2006" xmlns:p14="http://schemas.microsoft.com/office/powerpoint/2010/main" xmlns:aink="http://schemas.microsoft.com/office/drawing/2016/ink">
+        <mc:Choice Requires="p14 aink">
           <p:contentPart p14:bwMode="auto" r:id="rId43">
             <p14:nvContentPartPr>
               <p14:cNvPr id="38" name="잉크 37">
@@ -12897,7 +12930,7 @@
             </p14:xfrm>
           </p:contentPart>
         </mc:Choice>
-        <mc:Fallback>
+        <mc:Fallback xmlns="">
           <p:pic>
             <p:nvPicPr>
               <p:cNvPr id="38" name="잉크 37">
@@ -12928,8 +12961,8 @@
           </p:pic>
         </mc:Fallback>
       </mc:AlternateContent>
-      <mc:AlternateContent xmlns:mc="http://schemas.openxmlformats.org/markup-compatibility/2006">
-        <mc:Choice xmlns:p14="http://schemas.microsoft.com/office/powerpoint/2010/main" Requires="p14">
+      <mc:AlternateContent xmlns:mc="http://schemas.openxmlformats.org/markup-compatibility/2006" xmlns:p14="http://schemas.microsoft.com/office/powerpoint/2010/main">
+        <mc:Choice Requires="p14">
           <p:contentPart p14:bwMode="auto" r:id="rId45">
             <p14:nvContentPartPr>
               <p14:cNvPr id="45" name="잉크 44">
@@ -12948,7 +12981,7 @@
             </p14:xfrm>
           </p:contentPart>
         </mc:Choice>
-        <mc:Fallback>
+        <mc:Fallback xmlns="">
           <p:pic>
             <p:nvPicPr>
               <p:cNvPr id="45" name="잉크 44">
@@ -12979,8 +13012,8 @@
           </p:pic>
         </mc:Fallback>
       </mc:AlternateContent>
-      <mc:AlternateContent xmlns:mc="http://schemas.openxmlformats.org/markup-compatibility/2006">
-        <mc:Choice xmlns:p14="http://schemas.microsoft.com/office/powerpoint/2010/main" Requires="p14">
+      <mc:AlternateContent xmlns:mc="http://schemas.openxmlformats.org/markup-compatibility/2006" xmlns:p14="http://schemas.microsoft.com/office/powerpoint/2010/main">
+        <mc:Choice Requires="p14">
           <p:contentPart p14:bwMode="auto" r:id="rId47">
             <p14:nvContentPartPr>
               <p14:cNvPr id="46" name="잉크 45">
@@ -12999,7 +13032,7 @@
             </p14:xfrm>
           </p:contentPart>
         </mc:Choice>
-        <mc:Fallback>
+        <mc:Fallback xmlns="">
           <p:pic>
             <p:nvPicPr>
               <p:cNvPr id="46" name="잉크 45">
@@ -13030,8 +13063,8 @@
           </p:pic>
         </mc:Fallback>
       </mc:AlternateContent>
-      <mc:AlternateContent xmlns:mc="http://schemas.openxmlformats.org/markup-compatibility/2006">
-        <mc:Choice xmlns:p14="http://schemas.microsoft.com/office/powerpoint/2010/main" Requires="p14">
+      <mc:AlternateContent xmlns:mc="http://schemas.openxmlformats.org/markup-compatibility/2006" xmlns:p14="http://schemas.microsoft.com/office/powerpoint/2010/main">
+        <mc:Choice Requires="p14">
           <p:contentPart p14:bwMode="auto" r:id="rId49">
             <p14:nvContentPartPr>
               <p14:cNvPr id="47" name="잉크 46">
@@ -13050,7 +13083,7 @@
             </p14:xfrm>
           </p:contentPart>
         </mc:Choice>
-        <mc:Fallback>
+        <mc:Fallback xmlns="">
           <p:pic>
             <p:nvPicPr>
               <p:cNvPr id="47" name="잉크 46">
@@ -13081,8 +13114,8 @@
           </p:pic>
         </mc:Fallback>
       </mc:AlternateContent>
-      <mc:AlternateContent xmlns:mc="http://schemas.openxmlformats.org/markup-compatibility/2006">
-        <mc:Choice xmlns:p14="http://schemas.microsoft.com/office/powerpoint/2010/main" Requires="p14">
+      <mc:AlternateContent xmlns:mc="http://schemas.openxmlformats.org/markup-compatibility/2006" xmlns:p14="http://schemas.microsoft.com/office/powerpoint/2010/main">
+        <mc:Choice Requires="p14">
           <p:contentPart p14:bwMode="auto" r:id="rId51">
             <p14:nvContentPartPr>
               <p14:cNvPr id="48" name="잉크 47">
@@ -13101,7 +13134,7 @@
             </p14:xfrm>
           </p:contentPart>
         </mc:Choice>
-        <mc:Fallback>
+        <mc:Fallback xmlns="">
           <p:pic>
             <p:nvPicPr>
               <p:cNvPr id="48" name="잉크 47">
@@ -13132,8 +13165,8 @@
           </p:pic>
         </mc:Fallback>
       </mc:AlternateContent>
-      <mc:AlternateContent xmlns:mc="http://schemas.openxmlformats.org/markup-compatibility/2006">
-        <mc:Choice xmlns:p14="http://schemas.microsoft.com/office/powerpoint/2010/main" Requires="p14">
+      <mc:AlternateContent xmlns:mc="http://schemas.openxmlformats.org/markup-compatibility/2006" xmlns:p14="http://schemas.microsoft.com/office/powerpoint/2010/main">
+        <mc:Choice Requires="p14">
           <p:contentPart p14:bwMode="auto" r:id="rId53">
             <p14:nvContentPartPr>
               <p14:cNvPr id="49" name="잉크 48">
@@ -13152,7 +13185,7 @@
             </p14:xfrm>
           </p:contentPart>
         </mc:Choice>
-        <mc:Fallback>
+        <mc:Fallback xmlns="">
           <p:pic>
             <p:nvPicPr>
               <p:cNvPr id="49" name="잉크 48">
@@ -13183,8 +13216,8 @@
           </p:pic>
         </mc:Fallback>
       </mc:AlternateContent>
-      <mc:AlternateContent xmlns:mc="http://schemas.openxmlformats.org/markup-compatibility/2006">
-        <mc:Choice xmlns:p14="http://schemas.microsoft.com/office/powerpoint/2010/main" Requires="p14">
+      <mc:AlternateContent xmlns:mc="http://schemas.openxmlformats.org/markup-compatibility/2006" xmlns:p14="http://schemas.microsoft.com/office/powerpoint/2010/main">
+        <mc:Choice Requires="p14">
           <p:contentPart p14:bwMode="auto" r:id="rId55">
             <p14:nvContentPartPr>
               <p14:cNvPr id="50" name="잉크 49">
@@ -13203,7 +13236,7 @@
             </p14:xfrm>
           </p:contentPart>
         </mc:Choice>
-        <mc:Fallback>
+        <mc:Fallback xmlns="">
           <p:pic>
             <p:nvPicPr>
               <p:cNvPr id="50" name="잉크 49">
@@ -13347,8 +13380,8 @@
           </a:p>
         </p:txBody>
       </p:sp>
-      <mc:AlternateContent xmlns:mc="http://schemas.openxmlformats.org/markup-compatibility/2006">
-        <mc:Choice xmlns:p14="http://schemas.microsoft.com/office/powerpoint/2010/main" Requires="p14">
+      <mc:AlternateContent xmlns:mc="http://schemas.openxmlformats.org/markup-compatibility/2006" xmlns:p14="http://schemas.microsoft.com/office/powerpoint/2010/main">
+        <mc:Choice Requires="p14">
           <p:contentPart p14:bwMode="auto" r:id="rId57">
             <p14:nvContentPartPr>
               <p14:cNvPr id="52" name="잉크 51">
@@ -13367,7 +13400,7 @@
             </p14:xfrm>
           </p:contentPart>
         </mc:Choice>
-        <mc:Fallback>
+        <mc:Fallback xmlns="">
           <p:pic>
             <p:nvPicPr>
               <p:cNvPr id="52" name="잉크 51">

</xml_diff>